<commit_message>
updated the Status_update: now through analysis.py you can perform the analysis as described in slide #5
</commit_message>
<xml_diff>
--- a/docs/Stempel_Status.pptx
+++ b/docs/Stempel_Status.pptx
@@ -213,7 +213,7 @@
           <a:p>
             <a:fld id="{8CD0011A-C79D-9447-ABD0-A9E9C6AF36C5}" type="datetimeFigureOut">
               <a:rPr lang="en-US" smtClean="0"/>
-              <a:t>12/5/17</a:t>
+              <a:t>12/13/17</a:t>
             </a:fld>
             <a:endParaRPr lang="en-US"/>
           </a:p>
@@ -612,7 +612,7 @@
           <a:p>
             <a:fld id="{EA2FDEEC-B784-3F4C-8399-EACB20589474}" type="datetimeFigureOut">
               <a:rPr lang="de-DE" smtClean="0"/>
-              <a:t>05.12.17</a:t>
+              <a:t>13.12.17</a:t>
             </a:fld>
             <a:endParaRPr lang="de-DE"/>
           </a:p>
@@ -782,7 +782,7 @@
           <a:p>
             <a:fld id="{EA2FDEEC-B784-3F4C-8399-EACB20589474}" type="datetimeFigureOut">
               <a:rPr lang="de-DE" smtClean="0"/>
-              <a:t>05.12.17</a:t>
+              <a:t>13.12.17</a:t>
             </a:fld>
             <a:endParaRPr lang="de-DE"/>
           </a:p>
@@ -962,7 +962,7 @@
           <a:p>
             <a:fld id="{EA2FDEEC-B784-3F4C-8399-EACB20589474}" type="datetimeFigureOut">
               <a:rPr lang="de-DE" smtClean="0"/>
-              <a:t>05.12.17</a:t>
+              <a:t>13.12.17</a:t>
             </a:fld>
             <a:endParaRPr lang="de-DE"/>
           </a:p>
@@ -1132,7 +1132,7 @@
           <a:p>
             <a:fld id="{EA2FDEEC-B784-3F4C-8399-EACB20589474}" type="datetimeFigureOut">
               <a:rPr lang="de-DE" smtClean="0"/>
-              <a:t>05.12.17</a:t>
+              <a:t>13.12.17</a:t>
             </a:fld>
             <a:endParaRPr lang="de-DE"/>
           </a:p>
@@ -1378,7 +1378,7 @@
           <a:p>
             <a:fld id="{EA2FDEEC-B784-3F4C-8399-EACB20589474}" type="datetimeFigureOut">
               <a:rPr lang="de-DE" smtClean="0"/>
-              <a:t>05.12.17</a:t>
+              <a:t>13.12.17</a:t>
             </a:fld>
             <a:endParaRPr lang="de-DE"/>
           </a:p>
@@ -1610,7 +1610,7 @@
           <a:p>
             <a:fld id="{EA2FDEEC-B784-3F4C-8399-EACB20589474}" type="datetimeFigureOut">
               <a:rPr lang="de-DE" smtClean="0"/>
-              <a:t>05.12.17</a:t>
+              <a:t>13.12.17</a:t>
             </a:fld>
             <a:endParaRPr lang="de-DE"/>
           </a:p>
@@ -1977,7 +1977,7 @@
           <a:p>
             <a:fld id="{EA2FDEEC-B784-3F4C-8399-EACB20589474}" type="datetimeFigureOut">
               <a:rPr lang="de-DE" smtClean="0"/>
-              <a:t>05.12.17</a:t>
+              <a:t>13.12.17</a:t>
             </a:fld>
             <a:endParaRPr lang="de-DE"/>
           </a:p>
@@ -2095,7 +2095,7 @@
           <a:p>
             <a:fld id="{EA2FDEEC-B784-3F4C-8399-EACB20589474}" type="datetimeFigureOut">
               <a:rPr lang="de-DE" smtClean="0"/>
-              <a:t>05.12.17</a:t>
+              <a:t>13.12.17</a:t>
             </a:fld>
             <a:endParaRPr lang="de-DE"/>
           </a:p>
@@ -2190,7 +2190,7 @@
           <a:p>
             <a:fld id="{EA2FDEEC-B784-3F4C-8399-EACB20589474}" type="datetimeFigureOut">
               <a:rPr lang="de-DE" smtClean="0"/>
-              <a:t>05.12.17</a:t>
+              <a:t>13.12.17</a:t>
             </a:fld>
             <a:endParaRPr lang="de-DE"/>
           </a:p>
@@ -2467,7 +2467,7 @@
           <a:p>
             <a:fld id="{EA2FDEEC-B784-3F4C-8399-EACB20589474}" type="datetimeFigureOut">
               <a:rPr lang="de-DE" smtClean="0"/>
-              <a:t>05.12.17</a:t>
+              <a:t>13.12.17</a:t>
             </a:fld>
             <a:endParaRPr lang="de-DE"/>
           </a:p>
@@ -2720,7 +2720,7 @@
           <a:p>
             <a:fld id="{EA2FDEEC-B784-3F4C-8399-EACB20589474}" type="datetimeFigureOut">
               <a:rPr lang="de-DE" smtClean="0"/>
-              <a:t>05.12.17</a:t>
+              <a:t>13.12.17</a:t>
             </a:fld>
             <a:endParaRPr lang="de-DE"/>
           </a:p>
@@ -2933,7 +2933,7 @@
           <a:p>
             <a:fld id="{EA2FDEEC-B784-3F4C-8399-EACB20589474}" type="datetimeFigureOut">
               <a:rPr lang="de-DE" smtClean="0"/>
-              <a:t>05.12.17</a:t>
+              <a:t>13.12.17</a:t>
             </a:fld>
             <a:endParaRPr lang="de-DE"/>
           </a:p>
@@ -4217,8 +4217,12 @@
           <a:lstStyle/>
           <a:p>
             <a:r>
-              <a:rPr lang="en-US" dirty="0" smtClean="0"/>
-              <a:t>Coming features: </a:t>
+              <a:rPr lang="en-US" smtClean="0"/>
+              <a:t>Implemented features</a:t>
+            </a:r>
+            <a:r>
+              <a:rPr lang="en-US" dirty="0" smtClean="0"/>
+              <a:t>: </a:t>
             </a:r>
             <a:r>
               <a:rPr lang="en-US" dirty="0"/>
@@ -4310,11 +4314,7 @@
             </a:r>
             <a:r>
               <a:rPr lang="en-US" dirty="0" smtClean="0"/>
-              <a:t>MACHINEARCHITECTUREPATH </a:t>
-            </a:r>
-            <a:r>
-              <a:rPr lang="en-US" dirty="0" smtClean="0"/>
-              <a:t>--</a:t>
+              <a:t>MACHINEARCHITECTUREPATH --</a:t>
             </a:r>
             <a:r>
               <a:rPr lang="en-US" dirty="0" err="1" smtClean="0"/>
@@ -4322,11 +4322,7 @@
             </a:r>
             <a:r>
               <a:rPr lang="en-US" dirty="0" smtClean="0"/>
-              <a:t> </a:t>
-            </a:r>
-            <a:r>
-              <a:rPr lang="en-US" dirty="0" smtClean="0"/>
-              <a:t>$PROVAPATH $PROVAWORKSPACE --executions 5 --threads 2 4 8 16 32  --</a:t>
+              <a:t> $PROVAPATH $PROVAWORKSPACE --executions 5 --threads 2 4 8 16 32  --</a:t>
             </a:r>
             <a:r>
               <a:rPr lang="en-US" dirty="0" err="1" smtClean="0"/>
@@ -4352,12 +4348,24 @@
               <a:t>As before, plus it creates a project in PROVA! [PROVA16] for each of the generated stencils, compiles (using the selected </a:t>
             </a:r>
             <a:r>
-              <a:rPr lang="en-US" dirty="0" err="1" smtClean="0"/>
+              <a:rPr lang="en-US" i="1" dirty="0" err="1" smtClean="0"/>
               <a:t>method_type</a:t>
             </a:r>
             <a:r>
-              <a:rPr lang="en-US" dirty="0" smtClean="0"/>
-              <a:t>), and runs the generated code “</a:t>
+              <a:rPr lang="en-US" i="1" dirty="0" smtClean="0"/>
+              <a:t> </a:t>
+            </a:r>
+            <a:r>
+              <a:rPr lang="en-US" dirty="0"/>
+              <a:t>[PROVA16</a:t>
+            </a:r>
+            <a:r>
+              <a:rPr lang="en-US" dirty="0" smtClean="0"/>
+              <a:t>]), </a:t>
+            </a:r>
+            <a:r>
+              <a:rPr lang="en-US" dirty="0" smtClean="0"/>
+              <a:t>and runs the generated code “</a:t>
             </a:r>
             <a:r>
               <a:rPr lang="en-US" i="1" dirty="0" smtClean="0"/>
@@ -4365,25 +4373,32 @@
             </a:r>
             <a:r>
               <a:rPr lang="en-US" dirty="0" smtClean="0"/>
-              <a:t>” times on the </a:t>
-            </a:r>
-            <a:r>
-              <a:rPr lang="en-US" smtClean="0"/>
-              <a:t>current </a:t>
-            </a:r>
-            <a:r>
-              <a:rPr lang="en-US"/>
-              <a:t>architecture , for which you must pass the architectural description, </a:t>
-            </a:r>
-            <a:r>
-              <a:rPr lang="en-US" dirty="0" smtClean="0"/>
-              <a:t>using all the </a:t>
-            </a:r>
-            <a:r>
-              <a:rPr lang="en-US" smtClean="0"/>
-              <a:t>threads chosen</a:t>
-            </a:r>
-            <a:endParaRPr lang="en-US" dirty="0" smtClean="0"/>
+              <a:t>” times on the current </a:t>
+            </a:r>
+            <a:r>
+              <a:rPr lang="en-US" dirty="0"/>
+              <a:t>architecture </a:t>
+            </a:r>
+            <a:r>
+              <a:rPr lang="en-US" dirty="0"/>
+              <a:t>(</a:t>
+            </a:r>
+            <a:r>
+              <a:rPr lang="en-US" dirty="0" smtClean="0"/>
+              <a:t>for </a:t>
+            </a:r>
+            <a:r>
+              <a:rPr lang="en-US" dirty="0"/>
+              <a:t>which you must pass the architectural </a:t>
+            </a:r>
+            <a:r>
+              <a:rPr lang="en-US" dirty="0" smtClean="0"/>
+              <a:t>description), </a:t>
+            </a:r>
+            <a:r>
+              <a:rPr lang="en-US" dirty="0" smtClean="0"/>
+              <a:t>using all the threads chosen</a:t>
+            </a:r>
           </a:p>
           <a:p>
             <a:r>

</xml_diff>